<commit_message>
updated name of the ME drive
</commit_message>
<xml_diff>
--- a/01 - New Students/How to Connect to the GT Server Files.pptx
+++ b/01 - New Students/How to Connect to the GT Server Files.pptx
@@ -121,10 +121,6 @@
 </p:presentation>
 </file>
 
-<file path=ppt/revisionInfo.xml><?xml version="1.0" encoding="utf-8"?>
-<p1510:revInfo xmlns:a="http://schemas.openxmlformats.org/drawingml/2006/main" xmlns:r="http://schemas.openxmlformats.org/officeDocument/2006/relationships" xmlns:p1510="http://schemas.microsoft.com/office/powerpoint/2015/10/main"/>
-</file>
-
 <file path=ppt/slideLayouts/slideLayout1.xml><?xml version="1.0" encoding="utf-8"?>
 <p:sldLayout xmlns:a="http://schemas.openxmlformats.org/drawingml/2006/main" xmlns:r="http://schemas.openxmlformats.org/officeDocument/2006/relationships" xmlns:p="http://schemas.openxmlformats.org/presentationml/2006/main" type="title" preserve="1">
   <p:cSld name="Title Slide">
@@ -254,7 +250,7 @@
           <a:p>
             <a:fld id="{ED2FB5D7-8FF7-4C20-8E67-4450041A21D4}" type="datetimeFigureOut">
               <a:rPr lang="en-US" smtClean="0"/>
-              <a:t>1/18/2018</a:t>
+              <a:t>4/6/23</a:t>
             </a:fld>
             <a:endParaRPr lang="en-US"/>
           </a:p>
@@ -422,7 +418,7 @@
           <a:p>
             <a:fld id="{ED2FB5D7-8FF7-4C20-8E67-4450041A21D4}" type="datetimeFigureOut">
               <a:rPr lang="en-US" smtClean="0"/>
-              <a:t>1/18/2018</a:t>
+              <a:t>4/6/23</a:t>
             </a:fld>
             <a:endParaRPr lang="en-US"/>
           </a:p>
@@ -600,7 +596,7 @@
           <a:p>
             <a:fld id="{ED2FB5D7-8FF7-4C20-8E67-4450041A21D4}" type="datetimeFigureOut">
               <a:rPr lang="en-US" smtClean="0"/>
-              <a:t>1/18/2018</a:t>
+              <a:t>4/6/23</a:t>
             </a:fld>
             <a:endParaRPr lang="en-US"/>
           </a:p>
@@ -768,7 +764,7 @@
           <a:p>
             <a:fld id="{ED2FB5D7-8FF7-4C20-8E67-4450041A21D4}" type="datetimeFigureOut">
               <a:rPr lang="en-US" smtClean="0"/>
-              <a:t>1/18/2018</a:t>
+              <a:t>4/6/23</a:t>
             </a:fld>
             <a:endParaRPr lang="en-US"/>
           </a:p>
@@ -1013,7 +1009,7 @@
           <a:p>
             <a:fld id="{ED2FB5D7-8FF7-4C20-8E67-4450041A21D4}" type="datetimeFigureOut">
               <a:rPr lang="en-US" smtClean="0"/>
-              <a:t>1/18/2018</a:t>
+              <a:t>4/6/23</a:t>
             </a:fld>
             <a:endParaRPr lang="en-US"/>
           </a:p>
@@ -1242,7 +1238,7 @@
           <a:p>
             <a:fld id="{ED2FB5D7-8FF7-4C20-8E67-4450041A21D4}" type="datetimeFigureOut">
               <a:rPr lang="en-US" smtClean="0"/>
-              <a:t>1/18/2018</a:t>
+              <a:t>4/6/23</a:t>
             </a:fld>
             <a:endParaRPr lang="en-US"/>
           </a:p>
@@ -1606,7 +1602,7 @@
           <a:p>
             <a:fld id="{ED2FB5D7-8FF7-4C20-8E67-4450041A21D4}" type="datetimeFigureOut">
               <a:rPr lang="en-US" smtClean="0"/>
-              <a:t>1/18/2018</a:t>
+              <a:t>4/6/23</a:t>
             </a:fld>
             <a:endParaRPr lang="en-US"/>
           </a:p>
@@ -1723,7 +1719,7 @@
           <a:p>
             <a:fld id="{ED2FB5D7-8FF7-4C20-8E67-4450041A21D4}" type="datetimeFigureOut">
               <a:rPr lang="en-US" smtClean="0"/>
-              <a:t>1/18/2018</a:t>
+              <a:t>4/6/23</a:t>
             </a:fld>
             <a:endParaRPr lang="en-US"/>
           </a:p>
@@ -1818,7 +1814,7 @@
           <a:p>
             <a:fld id="{ED2FB5D7-8FF7-4C20-8E67-4450041A21D4}" type="datetimeFigureOut">
               <a:rPr lang="en-US" smtClean="0"/>
-              <a:t>1/18/2018</a:t>
+              <a:t>4/6/23</a:t>
             </a:fld>
             <a:endParaRPr lang="en-US"/>
           </a:p>
@@ -2093,7 +2089,7 @@
           <a:p>
             <a:fld id="{ED2FB5D7-8FF7-4C20-8E67-4450041A21D4}" type="datetimeFigureOut">
               <a:rPr lang="en-US" smtClean="0"/>
-              <a:t>1/18/2018</a:t>
+              <a:t>4/6/23</a:t>
             </a:fld>
             <a:endParaRPr lang="en-US"/>
           </a:p>
@@ -2345,7 +2341,7 @@
           <a:p>
             <a:fld id="{ED2FB5D7-8FF7-4C20-8E67-4450041A21D4}" type="datetimeFigureOut">
               <a:rPr lang="en-US" smtClean="0"/>
-              <a:t>1/18/2018</a:t>
+              <a:t>4/6/23</a:t>
             </a:fld>
             <a:endParaRPr lang="en-US"/>
           </a:p>
@@ -2556,7 +2552,7 @@
           <a:p>
             <a:fld id="{ED2FB5D7-8FF7-4C20-8E67-4450041A21D4}" type="datetimeFigureOut">
               <a:rPr lang="en-US" smtClean="0"/>
-              <a:t>1/18/2018</a:t>
+              <a:t>4/6/23</a:t>
             </a:fld>
             <a:endParaRPr lang="en-US"/>
           </a:p>
@@ -5296,7 +5292,23 @@
             </a:br>
             <a:r>
               <a:rPr lang="en-US" sz="2400" dirty="0"/>
-              <a:t>- Pick any drive letter not in use and enter address: \\mefile4.me.gatech.edu\Research\GTOR</a:t>
+              <a:t>- Pick any drive letter not in use and enter address: \\</a:t>
+            </a:r>
+            <a:r>
+              <a:rPr lang="en-US" sz="2400" dirty="0" err="1"/>
+              <a:t>ad.gatech</a:t>
+            </a:r>
+            <a:r>
+              <a:rPr lang="en-US" sz="2400" dirty="0"/>
+              <a:t>\</a:t>
+            </a:r>
+            <a:r>
+              <a:rPr lang="en-US" sz="2400" dirty="0" err="1"/>
+              <a:t>mefs</a:t>
+            </a:r>
+            <a:r>
+              <a:rPr lang="en-US" sz="2400" dirty="0"/>
+              <a:t>$</a:t>
             </a:r>
             <a:br>
               <a:rPr lang="en-US" sz="2400" dirty="0"/>
@@ -5370,6 +5382,50 @@
           </a:prstGeom>
         </p:spPr>
       </p:pic>
+      <p:sp>
+        <p:nvSpPr>
+          <p:cNvPr id="4" name="TextBox 3">
+            <a:extLst>
+              <a:ext uri="{FF2B5EF4-FFF2-40B4-BE49-F238E27FC236}">
+                <a16:creationId xmlns:a16="http://schemas.microsoft.com/office/drawing/2014/main" id="{79084CB5-83CF-8A3A-F7BA-57C82ADEE55E}"/>
+              </a:ext>
+            </a:extLst>
+          </p:cNvPr>
+          <p:cNvSpPr txBox="1"/>
+          <p:nvPr/>
+        </p:nvSpPr>
+        <p:spPr>
+          <a:xfrm>
+            <a:off x="3165231" y="1932496"/>
+            <a:ext cx="4276578" cy="369332"/>
+          </a:xfrm>
+          <a:prstGeom prst="rect">
+            <a:avLst/>
+          </a:prstGeom>
+          <a:solidFill>
+            <a:schemeClr val="bg1"/>
+          </a:solidFill>
+        </p:spPr>
+        <p:txBody>
+          <a:bodyPr wrap="square" rtlCol="0">
+            <a:spAutoFit/>
+          </a:bodyPr>
+          <a:lstStyle/>
+          <a:p>
+            <a:r>
+              <a:rPr lang="en-US" sz="1800" dirty="0">
+                <a:hlinkClick r:id="rId4"/>
+              </a:rPr>
+              <a:t>\\ad.gatech\mefs$</a:t>
+            </a:r>
+            <a:r>
+              <a:rPr lang="en-US" sz="1800" dirty="0"/>
+              <a:t>           </a:t>
+            </a:r>
+            <a:endParaRPr lang="en-US" dirty="0"/>
+          </a:p>
+        </p:txBody>
+      </p:sp>
     </p:spTree>
     <p:extLst>
       <p:ext uri="{BB962C8B-B14F-4D97-AF65-F5344CB8AC3E}">

</xml_diff>